<commit_message>
add image block erase program and update rtc command
</commit_message>
<xml_diff>
--- a/magic board memory plan.pptx
+++ b/magic board memory plan.pptx
@@ -6,6 +6,7 @@
   </p:sldMasterIdLst>
   <p:sldIdLst>
     <p:sldId id="257" r:id="rId2"/>
+    <p:sldId id="258" r:id="rId3"/>
   </p:sldIdLst>
   <p:sldSz cx="12192000" cy="6858000"/>
   <p:notesSz cx="6858000" cy="9144000"/>
@@ -249,7 +250,7 @@
           <a:p>
             <a:fld id="{9275EF9D-446A-4BA9-9A8F-8795C824CFA3}" type="datetimeFigureOut">
               <a:rPr lang="zh-TW" altLang="en-US" smtClean="0"/>
-              <a:t>2024/2/5</a:t>
+              <a:t>2024/2/21</a:t>
             </a:fld>
             <a:endParaRPr lang="zh-TW" altLang="en-US"/>
           </a:p>
@@ -417,7 +418,7 @@
           <a:p>
             <a:fld id="{9275EF9D-446A-4BA9-9A8F-8795C824CFA3}" type="datetimeFigureOut">
               <a:rPr lang="zh-TW" altLang="en-US" smtClean="0"/>
-              <a:t>2024/2/5</a:t>
+              <a:t>2024/2/21</a:t>
             </a:fld>
             <a:endParaRPr lang="zh-TW" altLang="en-US"/>
           </a:p>
@@ -595,7 +596,7 @@
           <a:p>
             <a:fld id="{9275EF9D-446A-4BA9-9A8F-8795C824CFA3}" type="datetimeFigureOut">
               <a:rPr lang="zh-TW" altLang="en-US" smtClean="0"/>
-              <a:t>2024/2/5</a:t>
+              <a:t>2024/2/21</a:t>
             </a:fld>
             <a:endParaRPr lang="zh-TW" altLang="en-US"/>
           </a:p>
@@ -763,7 +764,7 @@
           <a:p>
             <a:fld id="{9275EF9D-446A-4BA9-9A8F-8795C824CFA3}" type="datetimeFigureOut">
               <a:rPr lang="zh-TW" altLang="en-US" smtClean="0"/>
-              <a:t>2024/2/5</a:t>
+              <a:t>2024/2/21</a:t>
             </a:fld>
             <a:endParaRPr lang="zh-TW" altLang="en-US"/>
           </a:p>
@@ -1008,7 +1009,7 @@
           <a:p>
             <a:fld id="{9275EF9D-446A-4BA9-9A8F-8795C824CFA3}" type="datetimeFigureOut">
               <a:rPr lang="zh-TW" altLang="en-US" smtClean="0"/>
-              <a:t>2024/2/5</a:t>
+              <a:t>2024/2/21</a:t>
             </a:fld>
             <a:endParaRPr lang="zh-TW" altLang="en-US"/>
           </a:p>
@@ -1237,7 +1238,7 @@
           <a:p>
             <a:fld id="{9275EF9D-446A-4BA9-9A8F-8795C824CFA3}" type="datetimeFigureOut">
               <a:rPr lang="zh-TW" altLang="en-US" smtClean="0"/>
-              <a:t>2024/2/5</a:t>
+              <a:t>2024/2/21</a:t>
             </a:fld>
             <a:endParaRPr lang="zh-TW" altLang="en-US"/>
           </a:p>
@@ -1601,7 +1602,7 @@
           <a:p>
             <a:fld id="{9275EF9D-446A-4BA9-9A8F-8795C824CFA3}" type="datetimeFigureOut">
               <a:rPr lang="zh-TW" altLang="en-US" smtClean="0"/>
-              <a:t>2024/2/5</a:t>
+              <a:t>2024/2/21</a:t>
             </a:fld>
             <a:endParaRPr lang="zh-TW" altLang="en-US"/>
           </a:p>
@@ -1718,7 +1719,7 @@
           <a:p>
             <a:fld id="{9275EF9D-446A-4BA9-9A8F-8795C824CFA3}" type="datetimeFigureOut">
               <a:rPr lang="zh-TW" altLang="en-US" smtClean="0"/>
-              <a:t>2024/2/5</a:t>
+              <a:t>2024/2/21</a:t>
             </a:fld>
             <a:endParaRPr lang="zh-TW" altLang="en-US"/>
           </a:p>
@@ -1813,7 +1814,7 @@
           <a:p>
             <a:fld id="{9275EF9D-446A-4BA9-9A8F-8795C824CFA3}" type="datetimeFigureOut">
               <a:rPr lang="zh-TW" altLang="en-US" smtClean="0"/>
-              <a:t>2024/2/5</a:t>
+              <a:t>2024/2/21</a:t>
             </a:fld>
             <a:endParaRPr lang="zh-TW" altLang="en-US"/>
           </a:p>
@@ -2088,7 +2089,7 @@
           <a:p>
             <a:fld id="{9275EF9D-446A-4BA9-9A8F-8795C824CFA3}" type="datetimeFigureOut">
               <a:rPr lang="zh-TW" altLang="en-US" smtClean="0"/>
-              <a:t>2024/2/5</a:t>
+              <a:t>2024/2/21</a:t>
             </a:fld>
             <a:endParaRPr lang="zh-TW" altLang="en-US"/>
           </a:p>
@@ -2340,7 +2341,7 @@
           <a:p>
             <a:fld id="{9275EF9D-446A-4BA9-9A8F-8795C824CFA3}" type="datetimeFigureOut">
               <a:rPr lang="zh-TW" altLang="en-US" smtClean="0"/>
-              <a:t>2024/2/5</a:t>
+              <a:t>2024/2/21</a:t>
             </a:fld>
             <a:endParaRPr lang="zh-TW" altLang="en-US"/>
           </a:p>
@@ -2551,7 +2552,7 @@
           <a:p>
             <a:fld id="{9275EF9D-446A-4BA9-9A8F-8795C824CFA3}" type="datetimeFigureOut">
               <a:rPr lang="zh-TW" altLang="en-US" smtClean="0"/>
-              <a:t>2024/2/5</a:t>
+              <a:t>2024/2/21</a:t>
             </a:fld>
             <a:endParaRPr lang="zh-TW" altLang="en-US"/>
           </a:p>
@@ -3085,8 +3086,8 @@
         </p:nvSpPr>
         <p:spPr>
           <a:xfrm>
-            <a:off x="1477536" y="5185316"/>
-            <a:ext cx="3048000" cy="864220"/>
+            <a:off x="1477536" y="5185315"/>
+            <a:ext cx="3048000" cy="716721"/>
           </a:xfrm>
           <a:prstGeom prst="rect">
             <a:avLst/>
@@ -3122,18 +3123,25 @@
           <a:p>
             <a:pPr algn="ctr"/>
             <a:r>
-              <a:rPr lang="zh-TW">
+              <a:rPr lang="zh-TW" dirty="0">
                 <a:ea typeface="新細明體"/>
                 <a:cs typeface="Calibri"/>
               </a:rPr>
-              <a:t>APROM 1KB</a:t>
-            </a:r>
-            <a:endParaRPr lang="zh-TW"/>
+              <a:t>APROM </a:t>
+            </a:r>
+            <a:r>
+              <a:rPr lang="en-US" altLang="zh-TW" dirty="0">
+                <a:ea typeface="新細明體"/>
+                <a:cs typeface="Calibri"/>
+              </a:rPr>
+              <a:t>512B</a:t>
+            </a:r>
+            <a:endParaRPr lang="zh-TW" dirty="0"/>
           </a:p>
           <a:p>
             <a:pPr algn="ctr"/>
             <a:r>
-              <a:rPr lang="zh-TW" altLang="en-US">
+              <a:rPr lang="zh-TW" altLang="en-US" dirty="0">
                 <a:ea typeface="新細明體"/>
                 <a:cs typeface="Calibri"/>
               </a:rPr>
@@ -3453,10 +3461,242 @@
           </a:p>
         </p:txBody>
       </p:sp>
+      <p:sp>
+        <p:nvSpPr>
+          <p:cNvPr id="2" name="矩形 5">
+            <a:extLst>
+              <a:ext uri="{FF2B5EF4-FFF2-40B4-BE49-F238E27FC236}">
+                <a16:creationId xmlns:a16="http://schemas.microsoft.com/office/drawing/2014/main" id="{C415FC21-308D-C1BB-0071-1B4E4D5444D8}"/>
+              </a:ext>
+            </a:extLst>
+          </p:cNvPr>
+          <p:cNvSpPr/>
+          <p:nvPr/>
+        </p:nvSpPr>
+        <p:spPr>
+          <a:xfrm>
+            <a:off x="1477536" y="5896494"/>
+            <a:ext cx="3048000" cy="716721"/>
+          </a:xfrm>
+          <a:prstGeom prst="rect">
+            <a:avLst/>
+          </a:prstGeom>
+          <a:solidFill>
+            <a:schemeClr val="accent6"/>
+          </a:solidFill>
+          <a:ln>
+            <a:solidFill>
+              <a:schemeClr val="tx1"/>
+            </a:solidFill>
+          </a:ln>
+        </p:spPr>
+        <p:style>
+          <a:lnRef idx="2">
+            <a:schemeClr val="accent1">
+              <a:shade val="15000"/>
+            </a:schemeClr>
+          </a:lnRef>
+          <a:fillRef idx="1">
+            <a:schemeClr val="accent1"/>
+          </a:fillRef>
+          <a:effectRef idx="0">
+            <a:schemeClr val="accent1"/>
+          </a:effectRef>
+          <a:fontRef idx="minor">
+            <a:schemeClr val="lt1"/>
+          </a:fontRef>
+        </p:style>
+        <p:txBody>
+          <a:bodyPr lIns="91440" tIns="45720" rIns="91440" bIns="45720" rtlCol="0" anchor="ctr"/>
+          <a:lstStyle/>
+          <a:p>
+            <a:pPr algn="ctr"/>
+            <a:r>
+              <a:rPr lang="zh-TW" dirty="0">
+                <a:ea typeface="新細明體"/>
+                <a:cs typeface="Calibri"/>
+              </a:rPr>
+              <a:t>APROM </a:t>
+            </a:r>
+            <a:r>
+              <a:rPr lang="en-US" altLang="zh-TW" dirty="0">
+                <a:ea typeface="新細明體"/>
+                <a:cs typeface="Calibri"/>
+              </a:rPr>
+              <a:t>512B</a:t>
+            </a:r>
+            <a:endParaRPr lang="zh-TW" dirty="0"/>
+          </a:p>
+          <a:p>
+            <a:pPr algn="ctr"/>
+            <a:r>
+              <a:rPr lang="zh-TW" altLang="en-US" dirty="0">
+                <a:ea typeface="新細明體"/>
+                <a:cs typeface="Calibri"/>
+              </a:rPr>
+              <a:t>User </a:t>
+            </a:r>
+            <a:r>
+              <a:rPr lang="en-US" altLang="zh-TW" dirty="0">
+                <a:ea typeface="新細明體"/>
+                <a:cs typeface="Calibri"/>
+              </a:rPr>
+              <a:t>image</a:t>
+            </a:r>
+            <a:endParaRPr lang="zh-TW" altLang="en-US" dirty="0">
+              <a:ea typeface="新細明體"/>
+              <a:cs typeface="Calibri"/>
+            </a:endParaRPr>
+          </a:p>
+        </p:txBody>
+      </p:sp>
     </p:spTree>
     <p:extLst>
       <p:ext uri="{BB962C8B-B14F-4D97-AF65-F5344CB8AC3E}">
         <p14:creationId xmlns:p14="http://schemas.microsoft.com/office/powerpoint/2010/main" val="233327925"/>
+      </p:ext>
+    </p:extLst>
+  </p:cSld>
+  <p:clrMapOvr>
+    <a:masterClrMapping/>
+  </p:clrMapOvr>
+</p:sld>
+</file>
+
+<file path=ppt/slides/slide2.xml><?xml version="1.0" encoding="utf-8"?>
+<p:sld xmlns:a="http://schemas.openxmlformats.org/drawingml/2006/main" xmlns:r="http://schemas.openxmlformats.org/officeDocument/2006/relationships" xmlns:p="http://schemas.openxmlformats.org/presentationml/2006/main">
+  <p:cSld>
+    <p:spTree>
+      <p:nvGrpSpPr>
+        <p:cNvPr id="1" name=""/>
+        <p:cNvGrpSpPr/>
+        <p:nvPr/>
+      </p:nvGrpSpPr>
+      <p:grpSpPr>
+        <a:xfrm>
+          <a:off x="0" y="0"/>
+          <a:ext cx="0" cy="0"/>
+          <a:chOff x="0" y="0"/>
+          <a:chExt cx="0" cy="0"/>
+        </a:xfrm>
+      </p:grpSpPr>
+      <p:sp>
+        <p:nvSpPr>
+          <p:cNvPr id="2" name="Title 1">
+            <a:extLst>
+              <a:ext uri="{FF2B5EF4-FFF2-40B4-BE49-F238E27FC236}">
+                <a16:creationId xmlns:a16="http://schemas.microsoft.com/office/drawing/2014/main" id="{0AC0023D-0FEA-74F7-2866-D1AFFB56573E}"/>
+              </a:ext>
+            </a:extLst>
+          </p:cNvPr>
+          <p:cNvSpPr>
+            <a:spLocks noGrp="1"/>
+          </p:cNvSpPr>
+          <p:nvPr>
+            <p:ph type="title"/>
+          </p:nvPr>
+        </p:nvSpPr>
+        <p:spPr/>
+        <p:txBody>
+          <a:bodyPr/>
+          <a:lstStyle/>
+          <a:p>
+            <a:r>
+              <a:rPr lang="en-US" dirty="0"/>
+              <a:t>Image format</a:t>
+            </a:r>
+          </a:p>
+        </p:txBody>
+      </p:sp>
+      <p:sp>
+        <p:nvSpPr>
+          <p:cNvPr id="3" name="Content Placeholder 2">
+            <a:extLst>
+              <a:ext uri="{FF2B5EF4-FFF2-40B4-BE49-F238E27FC236}">
+                <a16:creationId xmlns:a16="http://schemas.microsoft.com/office/drawing/2014/main" id="{B3BCF0D4-119D-1343-74BF-AEEDF58638DA}"/>
+              </a:ext>
+            </a:extLst>
+          </p:cNvPr>
+          <p:cNvSpPr>
+            <a:spLocks noGrp="1"/>
+          </p:cNvSpPr>
+          <p:nvPr>
+            <p:ph idx="1"/>
+          </p:nvPr>
+        </p:nvSpPr>
+        <p:spPr/>
+        <p:txBody>
+          <a:bodyPr/>
+          <a:lstStyle/>
+          <a:p>
+            <a:r>
+              <a:rPr lang="en-US" altLang="zh-TW"/>
+              <a:t>Paint.exe</a:t>
+            </a:r>
+          </a:p>
+          <a:p>
+            <a:r>
+              <a:rPr lang="zh-TW" altLang="en-US" dirty="0"/>
+              <a:t>放大</a:t>
+            </a:r>
+            <a:r>
+              <a:rPr lang="en-US" altLang="zh-TW" dirty="0"/>
+              <a:t>800</a:t>
+            </a:r>
+            <a:r>
+              <a:rPr lang="zh-TW" altLang="en-US" dirty="0"/>
+              <a:t>倍去</a:t>
+            </a:r>
+            <a:r>
+              <a:rPr lang="en-US" altLang="zh-TW" dirty="0"/>
+              <a:t>edit</a:t>
+            </a:r>
+            <a:r>
+              <a:rPr lang="zh-TW" altLang="en-US" dirty="0"/>
+              <a:t> </a:t>
+            </a:r>
+            <a:r>
+              <a:rPr lang="en-US" altLang="zh-TW" dirty="0"/>
+              <a:t>image</a:t>
+            </a:r>
+            <a:endParaRPr lang="en-US" dirty="0"/>
+          </a:p>
+        </p:txBody>
+      </p:sp>
+      <p:pic>
+        <p:nvPicPr>
+          <p:cNvPr id="5" name="Picture 4">
+            <a:extLst>
+              <a:ext uri="{FF2B5EF4-FFF2-40B4-BE49-F238E27FC236}">
+                <a16:creationId xmlns:a16="http://schemas.microsoft.com/office/drawing/2014/main" id="{20AD6663-377E-3EB3-9BFD-379A862A3DDF}"/>
+              </a:ext>
+            </a:extLst>
+          </p:cNvPr>
+          <p:cNvPicPr>
+            <a:picLocks noChangeAspect="1"/>
+          </p:cNvPicPr>
+          <p:nvPr/>
+        </p:nvPicPr>
+        <p:blipFill>
+          <a:blip r:embed="rId2"/>
+          <a:stretch>
+            <a:fillRect/>
+          </a:stretch>
+        </p:blipFill>
+        <p:spPr>
+          <a:xfrm>
+            <a:off x="4756535" y="365125"/>
+            <a:ext cx="8286750" cy="6467475"/>
+          </a:xfrm>
+          <a:prstGeom prst="rect">
+            <a:avLst/>
+          </a:prstGeom>
+        </p:spPr>
+      </p:pic>
+    </p:spTree>
+    <p:extLst>
+      <p:ext uri="{BB962C8B-B14F-4D97-AF65-F5344CB8AC3E}">
+        <p14:creationId xmlns:p14="http://schemas.microsoft.com/office/powerpoint/2010/main" val="285426404"/>
       </p:ext>
     </p:extLst>
   </p:cSld>

</xml_diff>